<commit_message>
add 38-41th data,scripts, andslides
</commit_message>
<xml_diff>
--- a/R/スライド/第38回.pptx
+++ b/R/スライド/第38回.pptx
@@ -136,26 +136,46 @@
 <file path=ppt/changesInfos/changesInfo1.xml><?xml version="1.0" encoding="utf-8"?>
 <pc:chgInfo xmlns:a="http://schemas.openxmlformats.org/drawingml/2006/main" xmlns:r="http://schemas.openxmlformats.org/officeDocument/2006/relationships" xmlns:ac="http://schemas.microsoft.com/office/drawing/2013/main/command" xmlns:pc="http://schemas.microsoft.com/office/powerpoint/2013/main/command">
   <pc:docChgLst>
-    <pc:chgData name="Shin Fukui" userId="6902ee70c48ce296" providerId="LiveId" clId="{5094439A-AB85-DC47-9A28-B1205708008A}"/>
+    <pc:chgData name="Shin Fukui" userId="6902ee70c48ce296" providerId="LiveId" clId="{16F11BA0-E917-7B43-B45F-5804FB52050A}"/>
     <pc:docChg chg="modSld">
-      <pc:chgData name="Shin Fukui" userId="6902ee70c48ce296" providerId="LiveId" clId="{5094439A-AB85-DC47-9A28-B1205708008A}" dt="2024-06-16T13:45:42.235" v="0" actId="20577"/>
+      <pc:chgData name="Shin Fukui" userId="6902ee70c48ce296" providerId="LiveId" clId="{16F11BA0-E917-7B43-B45F-5804FB52050A}" dt="2024-10-01T07:00:38.391" v="4" actId="20577"/>
       <pc:docMkLst>
         <pc:docMk/>
       </pc:docMkLst>
-      <pc:sldChg chg="modSp mod">
-        <pc:chgData name="Shin Fukui" userId="6902ee70c48ce296" providerId="LiveId" clId="{5094439A-AB85-DC47-9A28-B1205708008A}" dt="2024-06-16T13:45:42.235" v="0" actId="20577"/>
+      <pc:sldChg chg="modNotesTx">
+        <pc:chgData name="Shin Fukui" userId="6902ee70c48ce296" providerId="LiveId" clId="{16F11BA0-E917-7B43-B45F-5804FB52050A}" dt="2024-10-01T07:00:14.844" v="0" actId="20577"/>
         <pc:sldMkLst>
           <pc:docMk/>
-          <pc:sldMk cId="1762357763" sldId="281"/>
+          <pc:sldMk cId="3662875377" sldId="258"/>
         </pc:sldMkLst>
-        <pc:spChg chg="mod">
-          <ac:chgData name="Shin Fukui" userId="6902ee70c48ce296" providerId="LiveId" clId="{5094439A-AB85-DC47-9A28-B1205708008A}" dt="2024-06-16T13:45:42.235" v="0" actId="20577"/>
-          <ac:spMkLst>
-            <pc:docMk/>
-            <pc:sldMk cId="1762357763" sldId="281"/>
-            <ac:spMk id="3" creationId="{3BAFEB17-DB4E-DC39-B618-5CC2D807229B}"/>
-          </ac:spMkLst>
-        </pc:spChg>
+      </pc:sldChg>
+      <pc:sldChg chg="modNotesTx">
+        <pc:chgData name="Shin Fukui" userId="6902ee70c48ce296" providerId="LiveId" clId="{16F11BA0-E917-7B43-B45F-5804FB52050A}" dt="2024-10-01T07:00:23.055" v="1" actId="20577"/>
+        <pc:sldMkLst>
+          <pc:docMk/>
+          <pc:sldMk cId="2251174560" sldId="270"/>
+        </pc:sldMkLst>
+      </pc:sldChg>
+      <pc:sldChg chg="modNotesTx">
+        <pc:chgData name="Shin Fukui" userId="6902ee70c48ce296" providerId="LiveId" clId="{16F11BA0-E917-7B43-B45F-5804FB52050A}" dt="2024-10-01T07:00:29.866" v="2" actId="20577"/>
+        <pc:sldMkLst>
+          <pc:docMk/>
+          <pc:sldMk cId="3179451906" sldId="272"/>
+        </pc:sldMkLst>
+      </pc:sldChg>
+      <pc:sldChg chg="modNotesTx">
+        <pc:chgData name="Shin Fukui" userId="6902ee70c48ce296" providerId="LiveId" clId="{16F11BA0-E917-7B43-B45F-5804FB52050A}" dt="2024-10-01T07:00:32.218" v="3" actId="20577"/>
+        <pc:sldMkLst>
+          <pc:docMk/>
+          <pc:sldMk cId="803930850" sldId="273"/>
+        </pc:sldMkLst>
+      </pc:sldChg>
+      <pc:sldChg chg="modNotesTx">
+        <pc:chgData name="Shin Fukui" userId="6902ee70c48ce296" providerId="LiveId" clId="{16F11BA0-E917-7B43-B45F-5804FB52050A}" dt="2024-10-01T07:00:38.391" v="4" actId="20577"/>
+        <pc:sldMkLst>
+          <pc:docMk/>
+          <pc:sldMk cId="2150872268" sldId="277"/>
+        </pc:sldMkLst>
       </pc:sldChg>
     </pc:docChg>
   </pc:docChgLst>
@@ -244,7 +264,7 @@
           <a:p>
             <a:fld id="{8474200F-657B-4C47-AD1A-9D4065BDDEBA}" type="datetimeFigureOut">
               <a:rPr kumimoji="1" lang="ja-JP" altLang="en-US" smtClean="0"/>
-              <a:t>2024/6/30</a:t>
+              <a:t>2024/10/1</a:t>
             </a:fld>
             <a:endParaRPr kumimoji="1" lang="ja-JP" altLang="en-US"/>
           </a:p>
@@ -1110,7 +1130,7 @@
           <a:p>
             <a:fld id="{A174F155-98B7-6C49-9B2A-096DDD09CD71}" type="datetimeFigureOut">
               <a:rPr kumimoji="1" lang="ja-JP" altLang="en-US" smtClean="0"/>
-              <a:t>2024/6/30</a:t>
+              <a:t>2024/10/1</a:t>
             </a:fld>
             <a:endParaRPr kumimoji="1" lang="ja-JP" altLang="en-US"/>
           </a:p>
@@ -1340,7 +1360,7 @@
           <a:p>
             <a:fld id="{A174F155-98B7-6C49-9B2A-096DDD09CD71}" type="datetimeFigureOut">
               <a:rPr kumimoji="1" lang="ja-JP" altLang="en-US" smtClean="0"/>
-              <a:t>2024/6/30</a:t>
+              <a:t>2024/10/1</a:t>
             </a:fld>
             <a:endParaRPr kumimoji="1" lang="ja-JP" altLang="en-US"/>
           </a:p>
@@ -1580,7 +1600,7 @@
           <a:p>
             <a:fld id="{A174F155-98B7-6C49-9B2A-096DDD09CD71}" type="datetimeFigureOut">
               <a:rPr kumimoji="1" lang="ja-JP" altLang="en-US" smtClean="0"/>
-              <a:t>2024/6/30</a:t>
+              <a:t>2024/10/1</a:t>
             </a:fld>
             <a:endParaRPr kumimoji="1" lang="ja-JP" altLang="en-US"/>
           </a:p>
@@ -1810,7 +1830,7 @@
           <a:p>
             <a:fld id="{A174F155-98B7-6C49-9B2A-096DDD09CD71}" type="datetimeFigureOut">
               <a:rPr kumimoji="1" lang="ja-JP" altLang="en-US" smtClean="0"/>
-              <a:t>2024/6/30</a:t>
+              <a:t>2024/10/1</a:t>
             </a:fld>
             <a:endParaRPr kumimoji="1" lang="ja-JP" altLang="en-US"/>
           </a:p>
@@ -2085,7 +2105,7 @@
           <a:p>
             <a:fld id="{A174F155-98B7-6C49-9B2A-096DDD09CD71}" type="datetimeFigureOut">
               <a:rPr kumimoji="1" lang="ja-JP" altLang="en-US" smtClean="0"/>
-              <a:t>2024/6/30</a:t>
+              <a:t>2024/10/1</a:t>
             </a:fld>
             <a:endParaRPr kumimoji="1" lang="ja-JP" altLang="en-US"/>
           </a:p>
@@ -2414,7 +2434,7 @@
           <a:p>
             <a:fld id="{A174F155-98B7-6C49-9B2A-096DDD09CD71}" type="datetimeFigureOut">
               <a:rPr kumimoji="1" lang="ja-JP" altLang="en-US" smtClean="0"/>
-              <a:t>2024/6/30</a:t>
+              <a:t>2024/10/1</a:t>
             </a:fld>
             <a:endParaRPr kumimoji="1" lang="ja-JP" altLang="en-US"/>
           </a:p>
@@ -2890,7 +2910,7 @@
           <a:p>
             <a:fld id="{A174F155-98B7-6C49-9B2A-096DDD09CD71}" type="datetimeFigureOut">
               <a:rPr kumimoji="1" lang="ja-JP" altLang="en-US" smtClean="0"/>
-              <a:t>2024/6/30</a:t>
+              <a:t>2024/10/1</a:t>
             </a:fld>
             <a:endParaRPr kumimoji="1" lang="ja-JP" altLang="en-US"/>
           </a:p>
@@ -3031,7 +3051,7 @@
           <a:p>
             <a:fld id="{A174F155-98B7-6C49-9B2A-096DDD09CD71}" type="datetimeFigureOut">
               <a:rPr kumimoji="1" lang="ja-JP" altLang="en-US" smtClean="0"/>
-              <a:t>2024/6/30</a:t>
+              <a:t>2024/10/1</a:t>
             </a:fld>
             <a:endParaRPr kumimoji="1" lang="ja-JP" altLang="en-US"/>
           </a:p>
@@ -3144,7 +3164,7 @@
           <a:p>
             <a:fld id="{A174F155-98B7-6C49-9B2A-096DDD09CD71}" type="datetimeFigureOut">
               <a:rPr kumimoji="1" lang="ja-JP" altLang="en-US" smtClean="0"/>
-              <a:t>2024/6/30</a:t>
+              <a:t>2024/10/1</a:t>
             </a:fld>
             <a:endParaRPr kumimoji="1" lang="ja-JP" altLang="en-US"/>
           </a:p>
@@ -3487,7 +3507,7 @@
           <a:p>
             <a:fld id="{A174F155-98B7-6C49-9B2A-096DDD09CD71}" type="datetimeFigureOut">
               <a:rPr kumimoji="1" lang="ja-JP" altLang="en-US" smtClean="0"/>
-              <a:t>2024/6/30</a:t>
+              <a:t>2024/10/1</a:t>
             </a:fld>
             <a:endParaRPr kumimoji="1" lang="ja-JP" altLang="en-US"/>
           </a:p>
@@ -3775,7 +3795,7 @@
           <a:p>
             <a:fld id="{A174F155-98B7-6C49-9B2A-096DDD09CD71}" type="datetimeFigureOut">
               <a:rPr kumimoji="1" lang="ja-JP" altLang="en-US" smtClean="0"/>
-              <a:t>2024/6/30</a:t>
+              <a:t>2024/10/1</a:t>
             </a:fld>
             <a:endParaRPr kumimoji="1" lang="ja-JP" altLang="en-US"/>
           </a:p>
@@ -4048,7 +4068,7 @@
           <a:p>
             <a:fld id="{A174F155-98B7-6C49-9B2A-096DDD09CD71}" type="datetimeFigureOut">
               <a:rPr kumimoji="1" lang="ja-JP" altLang="en-US" smtClean="0"/>
-              <a:t>2024/6/30</a:t>
+              <a:t>2024/10/1</a:t>
             </a:fld>
             <a:endParaRPr kumimoji="1" lang="ja-JP" altLang="en-US"/>
           </a:p>
@@ -12120,7 +12140,7 @@
             </a:r>
             <a:r>
               <a:rPr kumimoji="1" lang="en-US" altLang="ja-JP" dirty="0" err="1"/>
-              <a:t>lda</a:t>
+              <a:t>rda</a:t>
             </a:r>
             <a:r>
               <a:rPr kumimoji="1" lang="ja-JP" altLang="en-US"/>

</xml_diff>

<commit_message>
add R-intro05 and fixed R38
</commit_message>
<xml_diff>
--- a/R/スライド/第38回.pptx
+++ b/R/スライド/第38回.pptx
@@ -264,7 +264,7 @@
           <a:p>
             <a:fld id="{8474200F-657B-4C47-AD1A-9D4065BDDEBA}" type="datetimeFigureOut">
               <a:rPr kumimoji="1" lang="ja-JP" altLang="en-US" smtClean="0"/>
-              <a:t>2024/10/1</a:t>
+              <a:t>2024/10/13</a:t>
             </a:fld>
             <a:endParaRPr kumimoji="1" lang="ja-JP" altLang="en-US"/>
           </a:p>
@@ -607,7 +607,7 @@
           <a:bodyPr/>
           <a:lstStyle/>
           <a:p>
-            <a:endParaRPr kumimoji="1" lang="en-US" altLang="ja-JP" dirty="0"/>
+            <a:endParaRPr kumimoji="1" lang="ja-JP" altLang="en-US"/>
           </a:p>
         </p:txBody>
       </p:sp>
@@ -628,7 +628,7 @@
           <a:p>
             <a:fld id="{2A69BC5E-47CA-454B-819E-F5BD9B38F76F}" type="slidenum">
               <a:rPr kumimoji="1" lang="ja-JP" altLang="en-US" smtClean="0"/>
-              <a:t>2</a:t>
+              <a:t>1</a:t>
             </a:fld>
             <a:endParaRPr kumimoji="1" lang="ja-JP" altLang="en-US"/>
           </a:p>
@@ -637,7 +637,7 @@
     </p:spTree>
     <p:extLst>
       <p:ext uri="{BB962C8B-B14F-4D97-AF65-F5344CB8AC3E}">
-        <p14:creationId xmlns:p14="http://schemas.microsoft.com/office/powerpoint/2010/main" val="1398065462"/>
+        <p14:creationId xmlns:p14="http://schemas.microsoft.com/office/powerpoint/2010/main" val="2854775643"/>
       </p:ext>
     </p:extLst>
   </p:cSld>
@@ -691,7 +691,7 @@
           <a:bodyPr/>
           <a:lstStyle/>
           <a:p>
-            <a:endParaRPr kumimoji="1" lang="ja-JP" altLang="en-US"/>
+            <a:endParaRPr kumimoji="1" lang="en-US" altLang="ja-JP" dirty="0"/>
           </a:p>
         </p:txBody>
       </p:sp>
@@ -712,7 +712,7 @@
           <a:p>
             <a:fld id="{2A69BC5E-47CA-454B-819E-F5BD9B38F76F}" type="slidenum">
               <a:rPr kumimoji="1" lang="ja-JP" altLang="en-US" smtClean="0"/>
-              <a:t>6</a:t>
+              <a:t>2</a:t>
             </a:fld>
             <a:endParaRPr kumimoji="1" lang="ja-JP" altLang="en-US"/>
           </a:p>
@@ -721,7 +721,7 @@
     </p:spTree>
     <p:extLst>
       <p:ext uri="{BB962C8B-B14F-4D97-AF65-F5344CB8AC3E}">
-        <p14:creationId xmlns:p14="http://schemas.microsoft.com/office/powerpoint/2010/main" val="1646349152"/>
+        <p14:creationId xmlns:p14="http://schemas.microsoft.com/office/powerpoint/2010/main" val="1398065462"/>
       </p:ext>
     </p:extLst>
   </p:cSld>
@@ -796,7 +796,7 @@
           <a:p>
             <a:fld id="{2A69BC5E-47CA-454B-819E-F5BD9B38F76F}" type="slidenum">
               <a:rPr kumimoji="1" lang="ja-JP" altLang="en-US" smtClean="0"/>
-              <a:t>9</a:t>
+              <a:t>6</a:t>
             </a:fld>
             <a:endParaRPr kumimoji="1" lang="ja-JP" altLang="en-US"/>
           </a:p>
@@ -805,7 +805,7 @@
     </p:spTree>
     <p:extLst>
       <p:ext uri="{BB962C8B-B14F-4D97-AF65-F5344CB8AC3E}">
-        <p14:creationId xmlns:p14="http://schemas.microsoft.com/office/powerpoint/2010/main" val="3434608532"/>
+        <p14:creationId xmlns:p14="http://schemas.microsoft.com/office/powerpoint/2010/main" val="1646349152"/>
       </p:ext>
     </p:extLst>
   </p:cSld>
@@ -880,6 +880,90 @@
           <a:p>
             <a:fld id="{2A69BC5E-47CA-454B-819E-F5BD9B38F76F}" type="slidenum">
               <a:rPr kumimoji="1" lang="ja-JP" altLang="en-US" smtClean="0"/>
+              <a:t>9</a:t>
+            </a:fld>
+            <a:endParaRPr kumimoji="1" lang="ja-JP" altLang="en-US"/>
+          </a:p>
+        </p:txBody>
+      </p:sp>
+    </p:spTree>
+    <p:extLst>
+      <p:ext uri="{BB962C8B-B14F-4D97-AF65-F5344CB8AC3E}">
+        <p14:creationId xmlns:p14="http://schemas.microsoft.com/office/powerpoint/2010/main" val="3434608532"/>
+      </p:ext>
+    </p:extLst>
+  </p:cSld>
+  <p:clrMapOvr>
+    <a:masterClrMapping/>
+  </p:clrMapOvr>
+</p:notes>
+</file>
+
+<file path=ppt/notesSlides/notesSlide5.xml><?xml version="1.0" encoding="utf-8"?>
+<p:notes xmlns:a="http://schemas.openxmlformats.org/drawingml/2006/main" xmlns:r="http://schemas.openxmlformats.org/officeDocument/2006/relationships" xmlns:p="http://schemas.openxmlformats.org/presentationml/2006/main">
+  <p:cSld>
+    <p:spTree>
+      <p:nvGrpSpPr>
+        <p:cNvPr id="1" name=""/>
+        <p:cNvGrpSpPr/>
+        <p:nvPr/>
+      </p:nvGrpSpPr>
+      <p:grpSpPr>
+        <a:xfrm>
+          <a:off x="0" y="0"/>
+          <a:ext cx="0" cy="0"/>
+          <a:chOff x="0" y="0"/>
+          <a:chExt cx="0" cy="0"/>
+        </a:xfrm>
+      </p:grpSpPr>
+      <p:sp>
+        <p:nvSpPr>
+          <p:cNvPr id="2" name="スライド イメージ プレースホルダー 1"/>
+          <p:cNvSpPr>
+            <a:spLocks noGrp="1" noRot="1" noChangeAspect="1"/>
+          </p:cNvSpPr>
+          <p:nvPr>
+            <p:ph type="sldImg"/>
+          </p:nvPr>
+        </p:nvSpPr>
+        <p:spPr/>
+      </p:sp>
+      <p:sp>
+        <p:nvSpPr>
+          <p:cNvPr id="3" name="ノート プレースホルダー 2"/>
+          <p:cNvSpPr>
+            <a:spLocks noGrp="1"/>
+          </p:cNvSpPr>
+          <p:nvPr>
+            <p:ph type="body" idx="1"/>
+          </p:nvPr>
+        </p:nvSpPr>
+        <p:spPr/>
+        <p:txBody>
+          <a:bodyPr/>
+          <a:lstStyle/>
+          <a:p>
+            <a:endParaRPr kumimoji="1" lang="ja-JP" altLang="en-US"/>
+          </a:p>
+        </p:txBody>
+      </p:sp>
+      <p:sp>
+        <p:nvSpPr>
+          <p:cNvPr id="4" name="スライド番号プレースホルダー 3"/>
+          <p:cNvSpPr>
+            <a:spLocks noGrp="1"/>
+          </p:cNvSpPr>
+          <p:nvPr>
+            <p:ph type="sldNum" sz="quarter" idx="5"/>
+          </p:nvPr>
+        </p:nvSpPr>
+        <p:spPr/>
+        <p:txBody>
+          <a:bodyPr/>
+          <a:lstStyle/>
+          <a:p>
+            <a:fld id="{2A69BC5E-47CA-454B-819E-F5BD9B38F76F}" type="slidenum">
+              <a:rPr kumimoji="1" lang="ja-JP" altLang="en-US" smtClean="0"/>
               <a:t>10</a:t>
             </a:fld>
             <a:endParaRPr kumimoji="1" lang="ja-JP" altLang="en-US"/>
@@ -899,7 +983,7 @@
 </p:notes>
 </file>
 
-<file path=ppt/notesSlides/notesSlide5.xml><?xml version="1.0" encoding="utf-8"?>
+<file path=ppt/notesSlides/notesSlide6.xml><?xml version="1.0" encoding="utf-8"?>
 <p:notes xmlns:a="http://schemas.openxmlformats.org/drawingml/2006/main" xmlns:r="http://schemas.openxmlformats.org/officeDocument/2006/relationships" xmlns:p="http://schemas.openxmlformats.org/presentationml/2006/main">
   <p:cSld>
     <p:spTree>
@@ -1130,7 +1214,7 @@
           <a:p>
             <a:fld id="{A174F155-98B7-6C49-9B2A-096DDD09CD71}" type="datetimeFigureOut">
               <a:rPr kumimoji="1" lang="ja-JP" altLang="en-US" smtClean="0"/>
-              <a:t>2024/10/1</a:t>
+              <a:t>2024/10/13</a:t>
             </a:fld>
             <a:endParaRPr kumimoji="1" lang="ja-JP" altLang="en-US"/>
           </a:p>
@@ -1360,7 +1444,7 @@
           <a:p>
             <a:fld id="{A174F155-98B7-6C49-9B2A-096DDD09CD71}" type="datetimeFigureOut">
               <a:rPr kumimoji="1" lang="ja-JP" altLang="en-US" smtClean="0"/>
-              <a:t>2024/10/1</a:t>
+              <a:t>2024/10/13</a:t>
             </a:fld>
             <a:endParaRPr kumimoji="1" lang="ja-JP" altLang="en-US"/>
           </a:p>
@@ -1600,7 +1684,7 @@
           <a:p>
             <a:fld id="{A174F155-98B7-6C49-9B2A-096DDD09CD71}" type="datetimeFigureOut">
               <a:rPr kumimoji="1" lang="ja-JP" altLang="en-US" smtClean="0"/>
-              <a:t>2024/10/1</a:t>
+              <a:t>2024/10/13</a:t>
             </a:fld>
             <a:endParaRPr kumimoji="1" lang="ja-JP" altLang="en-US"/>
           </a:p>
@@ -1830,7 +1914,7 @@
           <a:p>
             <a:fld id="{A174F155-98B7-6C49-9B2A-096DDD09CD71}" type="datetimeFigureOut">
               <a:rPr kumimoji="1" lang="ja-JP" altLang="en-US" smtClean="0"/>
-              <a:t>2024/10/1</a:t>
+              <a:t>2024/10/13</a:t>
             </a:fld>
             <a:endParaRPr kumimoji="1" lang="ja-JP" altLang="en-US"/>
           </a:p>
@@ -2105,7 +2189,7 @@
           <a:p>
             <a:fld id="{A174F155-98B7-6C49-9B2A-096DDD09CD71}" type="datetimeFigureOut">
               <a:rPr kumimoji="1" lang="ja-JP" altLang="en-US" smtClean="0"/>
-              <a:t>2024/10/1</a:t>
+              <a:t>2024/10/13</a:t>
             </a:fld>
             <a:endParaRPr kumimoji="1" lang="ja-JP" altLang="en-US"/>
           </a:p>
@@ -2434,7 +2518,7 @@
           <a:p>
             <a:fld id="{A174F155-98B7-6C49-9B2A-096DDD09CD71}" type="datetimeFigureOut">
               <a:rPr kumimoji="1" lang="ja-JP" altLang="en-US" smtClean="0"/>
-              <a:t>2024/10/1</a:t>
+              <a:t>2024/10/13</a:t>
             </a:fld>
             <a:endParaRPr kumimoji="1" lang="ja-JP" altLang="en-US"/>
           </a:p>
@@ -2910,7 +2994,7 @@
           <a:p>
             <a:fld id="{A174F155-98B7-6C49-9B2A-096DDD09CD71}" type="datetimeFigureOut">
               <a:rPr kumimoji="1" lang="ja-JP" altLang="en-US" smtClean="0"/>
-              <a:t>2024/10/1</a:t>
+              <a:t>2024/10/13</a:t>
             </a:fld>
             <a:endParaRPr kumimoji="1" lang="ja-JP" altLang="en-US"/>
           </a:p>
@@ -3051,7 +3135,7 @@
           <a:p>
             <a:fld id="{A174F155-98B7-6C49-9B2A-096DDD09CD71}" type="datetimeFigureOut">
               <a:rPr kumimoji="1" lang="ja-JP" altLang="en-US" smtClean="0"/>
-              <a:t>2024/10/1</a:t>
+              <a:t>2024/10/13</a:t>
             </a:fld>
             <a:endParaRPr kumimoji="1" lang="ja-JP" altLang="en-US"/>
           </a:p>
@@ -3164,7 +3248,7 @@
           <a:p>
             <a:fld id="{A174F155-98B7-6C49-9B2A-096DDD09CD71}" type="datetimeFigureOut">
               <a:rPr kumimoji="1" lang="ja-JP" altLang="en-US" smtClean="0"/>
-              <a:t>2024/10/1</a:t>
+              <a:t>2024/10/13</a:t>
             </a:fld>
             <a:endParaRPr kumimoji="1" lang="ja-JP" altLang="en-US"/>
           </a:p>
@@ -3507,7 +3591,7 @@
           <a:p>
             <a:fld id="{A174F155-98B7-6C49-9B2A-096DDD09CD71}" type="datetimeFigureOut">
               <a:rPr kumimoji="1" lang="ja-JP" altLang="en-US" smtClean="0"/>
-              <a:t>2024/10/1</a:t>
+              <a:t>2024/10/13</a:t>
             </a:fld>
             <a:endParaRPr kumimoji="1" lang="ja-JP" altLang="en-US"/>
           </a:p>
@@ -3795,7 +3879,7 @@
           <a:p>
             <a:fld id="{A174F155-98B7-6C49-9B2A-096DDD09CD71}" type="datetimeFigureOut">
               <a:rPr kumimoji="1" lang="ja-JP" altLang="en-US" smtClean="0"/>
-              <a:t>2024/10/1</a:t>
+              <a:t>2024/10/13</a:t>
             </a:fld>
             <a:endParaRPr kumimoji="1" lang="ja-JP" altLang="en-US"/>
           </a:p>
@@ -4068,7 +4152,7 @@
           <a:p>
             <a:fld id="{A174F155-98B7-6C49-9B2A-096DDD09CD71}" type="datetimeFigureOut">
               <a:rPr kumimoji="1" lang="ja-JP" altLang="en-US" smtClean="0"/>
-              <a:t>2024/10/1</a:t>
+              <a:t>2024/10/13</a:t>
             </a:fld>
             <a:endParaRPr kumimoji="1" lang="ja-JP" altLang="en-US"/>
           </a:p>
@@ -12139,8 +12223,12 @@
               <a:t>の</a:t>
             </a:r>
             <a:r>
+              <a:rPr lang="en-US" altLang="ja-JP" dirty="0" err="1"/>
+              <a:t>l</a:t>
+            </a:r>
+            <a:r>
               <a:rPr kumimoji="1" lang="en-US" altLang="ja-JP" dirty="0" err="1"/>
-              <a:t>rda</a:t>
+              <a:t>da</a:t>
             </a:r>
             <a:r>
               <a:rPr kumimoji="1" lang="ja-JP" altLang="en-US"/>

</xml_diff>